<commit_message>
Se inseto datos de tablas independientes y generales
</commit_message>
<xml_diff>
--- a/database/databse_models.pptx
+++ b/database/databse_models.pptx
@@ -263,7 +263,7 @@
           <a:p>
             <a:fld id="{B03C6DC6-37D4-4B5C-968B-E60109460233}" type="datetimeFigureOut">
               <a:rPr lang="es-PE" smtClean="0"/>
-              <a:t>28/12/2021</a:t>
+              <a:t>29/12/2021</a:t>
             </a:fld>
             <a:endParaRPr lang="es-PE"/>
           </a:p>
@@ -463,7 +463,7 @@
           <a:p>
             <a:fld id="{B03C6DC6-37D4-4B5C-968B-E60109460233}" type="datetimeFigureOut">
               <a:rPr lang="es-PE" smtClean="0"/>
-              <a:t>28/12/2021</a:t>
+              <a:t>29/12/2021</a:t>
             </a:fld>
             <a:endParaRPr lang="es-PE"/>
           </a:p>
@@ -673,7 +673,7 @@
           <a:p>
             <a:fld id="{B03C6DC6-37D4-4B5C-968B-E60109460233}" type="datetimeFigureOut">
               <a:rPr lang="es-PE" smtClean="0"/>
-              <a:t>28/12/2021</a:t>
+              <a:t>29/12/2021</a:t>
             </a:fld>
             <a:endParaRPr lang="es-PE"/>
           </a:p>
@@ -873,7 +873,7 @@
           <a:p>
             <a:fld id="{B03C6DC6-37D4-4B5C-968B-E60109460233}" type="datetimeFigureOut">
               <a:rPr lang="es-PE" smtClean="0"/>
-              <a:t>28/12/2021</a:t>
+              <a:t>29/12/2021</a:t>
             </a:fld>
             <a:endParaRPr lang="es-PE"/>
           </a:p>
@@ -1149,7 +1149,7 @@
           <a:p>
             <a:fld id="{B03C6DC6-37D4-4B5C-968B-E60109460233}" type="datetimeFigureOut">
               <a:rPr lang="es-PE" smtClean="0"/>
-              <a:t>28/12/2021</a:t>
+              <a:t>29/12/2021</a:t>
             </a:fld>
             <a:endParaRPr lang="es-PE"/>
           </a:p>
@@ -1417,7 +1417,7 @@
           <a:p>
             <a:fld id="{B03C6DC6-37D4-4B5C-968B-E60109460233}" type="datetimeFigureOut">
               <a:rPr lang="es-PE" smtClean="0"/>
-              <a:t>28/12/2021</a:t>
+              <a:t>29/12/2021</a:t>
             </a:fld>
             <a:endParaRPr lang="es-PE"/>
           </a:p>
@@ -1832,7 +1832,7 @@
           <a:p>
             <a:fld id="{B03C6DC6-37D4-4B5C-968B-E60109460233}" type="datetimeFigureOut">
               <a:rPr lang="es-PE" smtClean="0"/>
-              <a:t>28/12/2021</a:t>
+              <a:t>29/12/2021</a:t>
             </a:fld>
             <a:endParaRPr lang="es-PE"/>
           </a:p>
@@ -1974,7 +1974,7 @@
           <a:p>
             <a:fld id="{B03C6DC6-37D4-4B5C-968B-E60109460233}" type="datetimeFigureOut">
               <a:rPr lang="es-PE" smtClean="0"/>
-              <a:t>28/12/2021</a:t>
+              <a:t>29/12/2021</a:t>
             </a:fld>
             <a:endParaRPr lang="es-PE"/>
           </a:p>
@@ -2087,7 +2087,7 @@
           <a:p>
             <a:fld id="{B03C6DC6-37D4-4B5C-968B-E60109460233}" type="datetimeFigureOut">
               <a:rPr lang="es-PE" smtClean="0"/>
-              <a:t>28/12/2021</a:t>
+              <a:t>29/12/2021</a:t>
             </a:fld>
             <a:endParaRPr lang="es-PE"/>
           </a:p>
@@ -2400,7 +2400,7 @@
           <a:p>
             <a:fld id="{B03C6DC6-37D4-4B5C-968B-E60109460233}" type="datetimeFigureOut">
               <a:rPr lang="es-PE" smtClean="0"/>
-              <a:t>28/12/2021</a:t>
+              <a:t>29/12/2021</a:t>
             </a:fld>
             <a:endParaRPr lang="es-PE"/>
           </a:p>
@@ -2689,7 +2689,7 @@
           <a:p>
             <a:fld id="{B03C6DC6-37D4-4B5C-968B-E60109460233}" type="datetimeFigureOut">
               <a:rPr lang="es-PE" smtClean="0"/>
-              <a:t>28/12/2021</a:t>
+              <a:t>29/12/2021</a:t>
             </a:fld>
             <a:endParaRPr lang="es-PE"/>
           </a:p>
@@ -2932,7 +2932,7 @@
           <a:p>
             <a:fld id="{B03C6DC6-37D4-4B5C-968B-E60109460233}" type="datetimeFigureOut">
               <a:rPr lang="es-PE" smtClean="0"/>
-              <a:t>28/12/2021</a:t>
+              <a:t>29/12/2021</a:t>
             </a:fld>
             <a:endParaRPr lang="es-PE"/>
           </a:p>
@@ -4461,39 +4461,6 @@
           </a:p>
         </p:txBody>
       </p:sp>
-      <p:pic>
-        <p:nvPicPr>
-          <p:cNvPr id="5" name="Imagen 4">
-            <a:extLst>
-              <a:ext uri="{FF2B5EF4-FFF2-40B4-BE49-F238E27FC236}">
-                <a16:creationId xmlns:a16="http://schemas.microsoft.com/office/drawing/2014/main" id="{258398B2-18EB-47D7-96C6-124CA94CA8D6}"/>
-              </a:ext>
-            </a:extLst>
-          </p:cNvPr>
-          <p:cNvPicPr>
-            <a:picLocks noChangeAspect="1"/>
-          </p:cNvPicPr>
-          <p:nvPr/>
-        </p:nvPicPr>
-        <p:blipFill>
-          <a:blip r:embed="rId2"/>
-          <a:stretch>
-            <a:fillRect/>
-          </a:stretch>
-        </p:blipFill>
-        <p:spPr>
-          <a:xfrm>
-            <a:off x="643467" y="1145488"/>
-            <a:ext cx="10905066" cy="4567023"/>
-          </a:xfrm>
-          <a:prstGeom prst="rect">
-            <a:avLst/>
-          </a:prstGeom>
-          <a:ln>
-            <a:noFill/>
-          </a:ln>
-        </p:spPr>
-      </p:pic>
       <p:sp>
         <p:nvSpPr>
           <p:cNvPr id="22" name="Isosceles Triangle 21">
@@ -4559,6 +4526,36 @@
           </a:p>
         </p:txBody>
       </p:sp>
+      <p:pic>
+        <p:nvPicPr>
+          <p:cNvPr id="2" name="Imagen 1">
+            <a:extLst>
+              <a:ext uri="{FF2B5EF4-FFF2-40B4-BE49-F238E27FC236}">
+                <a16:creationId xmlns:a16="http://schemas.microsoft.com/office/drawing/2014/main" id="{DD8E95BF-E0F7-4711-83F6-987FEC0E1BC9}"/>
+              </a:ext>
+            </a:extLst>
+          </p:cNvPr>
+          <p:cNvPicPr>
+            <a:picLocks noChangeAspect="1"/>
+          </p:cNvPicPr>
+          <p:nvPr/>
+        </p:nvPicPr>
+        <p:blipFill>
+          <a:blip r:embed="rId2"/>
+          <a:stretch>
+            <a:fillRect/>
+          </a:stretch>
+        </p:blipFill>
+        <p:spPr>
+          <a:xfrm>
+            <a:off x="0" y="876005"/>
+            <a:ext cx="12192000" cy="5105989"/>
+          </a:xfrm>
+          <a:prstGeom prst="rect">
+            <a:avLst/>
+          </a:prstGeom>
+        </p:spPr>
+      </p:pic>
     </p:spTree>
     <p:extLst>
       <p:ext uri="{BB962C8B-B14F-4D97-AF65-F5344CB8AC3E}">
@@ -5081,39 +5078,6 @@
           </a:p>
         </p:txBody>
       </p:sp>
-      <p:pic>
-        <p:nvPicPr>
-          <p:cNvPr id="3" name="Imagen 2">
-            <a:extLst>
-              <a:ext uri="{FF2B5EF4-FFF2-40B4-BE49-F238E27FC236}">
-                <a16:creationId xmlns:a16="http://schemas.microsoft.com/office/drawing/2014/main" id="{3D90DDEC-F29E-442B-A604-F3A82F6E579F}"/>
-              </a:ext>
-            </a:extLst>
-          </p:cNvPr>
-          <p:cNvPicPr>
-            <a:picLocks noChangeAspect="1"/>
-          </p:cNvPicPr>
-          <p:nvPr/>
-        </p:nvPicPr>
-        <p:blipFill>
-          <a:blip r:embed="rId2"/>
-          <a:stretch>
-            <a:fillRect/>
-          </a:stretch>
-        </p:blipFill>
-        <p:spPr>
-          <a:xfrm>
-            <a:off x="643467" y="1392400"/>
-            <a:ext cx="10905066" cy="4073199"/>
-          </a:xfrm>
-          <a:prstGeom prst="rect">
-            <a:avLst/>
-          </a:prstGeom>
-          <a:ln>
-            <a:noFill/>
-          </a:ln>
-        </p:spPr>
-      </p:pic>
       <p:sp>
         <p:nvSpPr>
           <p:cNvPr id="20" name="Isosceles Triangle 19">
@@ -5179,6 +5143,36 @@
           </a:p>
         </p:txBody>
       </p:sp>
+      <p:pic>
+        <p:nvPicPr>
+          <p:cNvPr id="2" name="Imagen 1">
+            <a:extLst>
+              <a:ext uri="{FF2B5EF4-FFF2-40B4-BE49-F238E27FC236}">
+                <a16:creationId xmlns:a16="http://schemas.microsoft.com/office/drawing/2014/main" id="{70E917D2-C2E7-4CC3-A615-5C7A28F96A45}"/>
+              </a:ext>
+            </a:extLst>
+          </p:cNvPr>
+          <p:cNvPicPr>
+            <a:picLocks noChangeAspect="1"/>
+          </p:cNvPicPr>
+          <p:nvPr/>
+        </p:nvPicPr>
+        <p:blipFill>
+          <a:blip r:embed="rId2"/>
+          <a:stretch>
+            <a:fillRect/>
+          </a:stretch>
+        </p:blipFill>
+        <p:spPr>
+          <a:xfrm>
+            <a:off x="0" y="1152056"/>
+            <a:ext cx="12192000" cy="4553888"/>
+          </a:xfrm>
+          <a:prstGeom prst="rect">
+            <a:avLst/>
+          </a:prstGeom>
+        </p:spPr>
+      </p:pic>
     </p:spTree>
     <p:extLst>
       <p:ext uri="{BB962C8B-B14F-4D97-AF65-F5344CB8AC3E}">

</xml_diff>